<commit_message>
Update language files and website title
</commit_message>
<xml_diff>
--- a/dev/notes/icon.pptx
+++ b/dev/notes/icon.pptx
@@ -3036,7 +3036,7 @@
               <a:rPr lang="en-US" altLang="zh-CN" sz="11500" b="1">
                 <a:ln/>
                 <a:solidFill>
-                  <a:schemeClr val="accent4"/>
+                  <a:schemeClr val="accent1"/>
                 </a:solidFill>
                 <a:effectLst>
                   <a:outerShdw blurRad="38100" dist="25400" dir="5400000" algn="ctr" rotWithShape="0">
@@ -3053,7 +3053,7 @@
             <a:endParaRPr lang="en-US" altLang="zh-CN" sz="11500" b="1">
               <a:ln/>
               <a:solidFill>
-                <a:schemeClr val="accent4"/>
+                <a:schemeClr val="accent1"/>
               </a:solidFill>
               <a:effectLst>
                 <a:outerShdw blurRad="38100" dist="25400" dir="5400000" algn="ctr" rotWithShape="0">
@@ -3064,6 +3064,527 @@
               </a:effectLst>
               <a:latin typeface="Ink Free" panose="03080402000500000000" charset="0"/>
               <a:cs typeface="Ink Free" panose="03080402000500000000" charset="0"/>
+            </a:endParaRPr>
+          </a:p>
+        </p:txBody>
+      </p:sp>
+      <p:sp>
+        <p:nvSpPr>
+          <p:cNvPr id="12" name="Rectangles 11"/>
+          <p:cNvSpPr/>
+          <p:nvPr/>
+        </p:nvSpPr>
+        <p:spPr>
+          <a:xfrm>
+            <a:off x="9277668" y="3012440"/>
+            <a:ext cx="1210945" cy="2646045"/>
+          </a:xfrm>
+          <a:prstGeom prst="rect">
+            <a:avLst/>
+          </a:prstGeom>
+          <a:noFill/>
+          <a:ln>
+            <a:noFill/>
+          </a:ln>
+        </p:spPr>
+        <p:txBody>
+          <a:bodyPr wrap="none" rtlCol="0" anchor="t">
+            <a:spAutoFit/>
+          </a:bodyPr>
+          <a:p>
+            <a:pPr algn="ctr"/>
+            <a:r>
+              <a:rPr lang="en-US" altLang="zh-CN" sz="16600" b="1">
+                <a:ln/>
+                <a:solidFill>
+                  <a:schemeClr val="accent1"/>
+                </a:solidFill>
+                <a:effectLst>
+                  <a:outerShdw blurRad="38100" dist="25400" dir="5400000" algn="ctr" rotWithShape="0">
+                    <a:srgbClr val="6E747A">
+                      <a:alpha val="43000"/>
+                    </a:srgbClr>
+                  </a:outerShdw>
+                </a:effectLst>
+              </a:rPr>
+              <a:t>E</a:t>
+            </a:r>
+            <a:endParaRPr lang="en-US" altLang="zh-CN" sz="16600" b="1">
+              <a:ln/>
+              <a:solidFill>
+                <a:schemeClr val="accent1"/>
+              </a:solidFill>
+              <a:effectLst>
+                <a:outerShdw blurRad="38100" dist="25400" dir="5400000" algn="ctr" rotWithShape="0">
+                  <a:srgbClr val="6E747A">
+                    <a:alpha val="43000"/>
+                  </a:srgbClr>
+                </a:outerShdw>
+              </a:effectLst>
+            </a:endParaRPr>
+          </a:p>
+        </p:txBody>
+      </p:sp>
+      <p:sp>
+        <p:nvSpPr>
+          <p:cNvPr id="13" name="Rectangles 12"/>
+          <p:cNvSpPr/>
+          <p:nvPr/>
+        </p:nvSpPr>
+        <p:spPr>
+          <a:xfrm>
+            <a:off x="7848600" y="2453640"/>
+            <a:ext cx="2057400" cy="975360"/>
+          </a:xfrm>
+          <a:prstGeom prst="rect">
+            <a:avLst/>
+          </a:prstGeom>
+          <a:gradFill>
+            <a:gsLst>
+              <a:gs pos="0">
+                <a:schemeClr val="accent1">
+                  <a:lumMod val="5000"/>
+                  <a:lumOff val="95000"/>
+                </a:schemeClr>
+              </a:gs>
+              <a:gs pos="74000">
+                <a:schemeClr val="accent1">
+                  <a:lumMod val="45000"/>
+                  <a:lumOff val="55000"/>
+                </a:schemeClr>
+              </a:gs>
+              <a:gs pos="83000">
+                <a:schemeClr val="accent1">
+                  <a:lumMod val="45000"/>
+                  <a:lumOff val="55000"/>
+                </a:schemeClr>
+              </a:gs>
+              <a:gs pos="100000">
+                <a:schemeClr val="accent1">
+                  <a:lumMod val="30000"/>
+                  <a:lumOff val="70000"/>
+                </a:schemeClr>
+              </a:gs>
+            </a:gsLst>
+            <a:lin ang="15840000" scaled="0"/>
+          </a:gradFill>
+        </p:spPr>
+        <p:style>
+          <a:lnRef idx="2">
+            <a:schemeClr val="accent1">
+              <a:lumMod val="75000"/>
+            </a:schemeClr>
+          </a:lnRef>
+          <a:fillRef idx="1">
+            <a:schemeClr val="accent1"/>
+          </a:fillRef>
+          <a:effectRef idx="0">
+            <a:srgbClr val="FFFFFF"/>
+          </a:effectRef>
+          <a:fontRef idx="minor">
+            <a:schemeClr val="lt1"/>
+          </a:fontRef>
+        </p:style>
+        <p:txBody>
+          <a:bodyPr rtlCol="0" anchor="ctr"/>
+          <a:p>
+            <a:pPr algn="ctr"/>
+            <a:endParaRPr lang="en-US"/>
+          </a:p>
+        </p:txBody>
+      </p:sp>
+      <p:sp>
+        <p:nvSpPr>
+          <p:cNvPr id="11" name="Rectangles 10"/>
+          <p:cNvSpPr/>
+          <p:nvPr/>
+        </p:nvSpPr>
+        <p:spPr>
+          <a:xfrm>
+            <a:off x="7848600" y="2388235"/>
+            <a:ext cx="2148840" cy="1106805"/>
+          </a:xfrm>
+          <a:prstGeom prst="rect">
+            <a:avLst/>
+          </a:prstGeom>
+          <a:noFill/>
+          <a:ln>
+            <a:noFill/>
+          </a:ln>
+        </p:spPr>
+        <p:txBody>
+          <a:bodyPr wrap="none" rtlCol="0" anchor="t">
+            <a:spAutoFit/>
+          </a:bodyPr>
+          <a:p>
+            <a:pPr algn="ctr"/>
+            <a:r>
+              <a:rPr lang="en-US" altLang="zh-CN" sz="6600" b="1">
+                <a:ln/>
+                <a:solidFill>
+                  <a:schemeClr val="accent1"/>
+                </a:solidFill>
+                <a:effectLst>
+                  <a:outerShdw blurRad="38100" dist="25400" dir="5400000" algn="ctr" rotWithShape="0">
+                    <a:srgbClr val="6E747A">
+                      <a:alpha val="43000"/>
+                    </a:srgbClr>
+                  </a:outerShdw>
+                </a:effectLst>
+                <a:latin typeface="Cascadia Mono ExtraLight" panose="020B0609020000020004" charset="0"/>
+                <a:cs typeface="Cascadia Mono ExtraLight" panose="020B0609020000020004" charset="0"/>
+              </a:rPr>
+              <a:t>elb3</a:t>
+            </a:r>
+            <a:endParaRPr lang="en-US" altLang="zh-CN" sz="6600" b="1">
+              <a:ln/>
+              <a:solidFill>
+                <a:schemeClr val="accent1"/>
+              </a:solidFill>
+              <a:effectLst>
+                <a:outerShdw blurRad="38100" dist="25400" dir="5400000" algn="ctr" rotWithShape="0">
+                  <a:srgbClr val="6E747A">
+                    <a:alpha val="43000"/>
+                  </a:srgbClr>
+                </a:outerShdw>
+              </a:effectLst>
+              <a:latin typeface="Cascadia Mono ExtraLight" panose="020B0609020000020004" charset="0"/>
+              <a:cs typeface="Cascadia Mono ExtraLight" panose="020B0609020000020004" charset="0"/>
+            </a:endParaRPr>
+          </a:p>
+        </p:txBody>
+      </p:sp>
+      <p:sp>
+        <p:nvSpPr>
+          <p:cNvPr id="16" name="Rectangles 15"/>
+          <p:cNvSpPr/>
+          <p:nvPr/>
+        </p:nvSpPr>
+        <p:spPr>
+          <a:xfrm>
+            <a:off x="4678680" y="2519680"/>
+            <a:ext cx="1005840" cy="975360"/>
+          </a:xfrm>
+          <a:prstGeom prst="rect">
+            <a:avLst/>
+          </a:prstGeom>
+          <a:gradFill>
+            <a:gsLst>
+              <a:gs pos="0">
+                <a:schemeClr val="accent1">
+                  <a:lumMod val="5000"/>
+                  <a:lumOff val="95000"/>
+                </a:schemeClr>
+              </a:gs>
+              <a:gs pos="74000">
+                <a:schemeClr val="accent1">
+                  <a:lumMod val="45000"/>
+                  <a:lumOff val="55000"/>
+                </a:schemeClr>
+              </a:gs>
+              <a:gs pos="83000">
+                <a:schemeClr val="accent1">
+                  <a:lumMod val="45000"/>
+                  <a:lumOff val="55000"/>
+                </a:schemeClr>
+              </a:gs>
+              <a:gs pos="100000">
+                <a:schemeClr val="accent1">
+                  <a:lumMod val="30000"/>
+                  <a:lumOff val="70000"/>
+                </a:schemeClr>
+              </a:gs>
+            </a:gsLst>
+            <a:lin ang="15840000" scaled="0"/>
+          </a:gradFill>
+          <a:ln w="38100"/>
+        </p:spPr>
+        <p:style>
+          <a:lnRef idx="2">
+            <a:schemeClr val="accent1">
+              <a:lumMod val="75000"/>
+            </a:schemeClr>
+          </a:lnRef>
+          <a:fillRef idx="1">
+            <a:schemeClr val="accent1"/>
+          </a:fillRef>
+          <a:effectRef idx="0">
+            <a:srgbClr val="FFFFFF"/>
+          </a:effectRef>
+          <a:fontRef idx="minor">
+            <a:schemeClr val="lt1"/>
+          </a:fontRef>
+        </p:style>
+        <p:txBody>
+          <a:bodyPr rtlCol="0" anchor="ctr"/>
+          <a:p>
+            <a:pPr algn="ctr"/>
+            <a:endParaRPr lang="en-US"/>
+          </a:p>
+        </p:txBody>
+      </p:sp>
+      <p:sp>
+        <p:nvSpPr>
+          <p:cNvPr id="14" name="Text Box 13"/>
+          <p:cNvSpPr txBox="1"/>
+          <p:nvPr/>
+        </p:nvSpPr>
+        <p:spPr>
+          <a:xfrm>
+            <a:off x="4678680" y="1806575"/>
+            <a:ext cx="944880" cy="878840"/>
+          </a:xfrm>
+          <a:prstGeom prst="rect">
+            <a:avLst/>
+          </a:prstGeom>
+          <a:noFill/>
+          <a:effectLst>
+            <a:outerShdw blurRad="50800" dist="38100" dir="2700000" algn="tl" rotWithShape="0">
+              <a:prstClr val="black">
+                <a:alpha val="40000"/>
+              </a:prstClr>
+            </a:outerShdw>
+          </a:effectLst>
+        </p:spPr>
+        <p:txBody>
+          <a:bodyPr wrap="square" rtlCol="0" anchor="t">
+            <a:noAutofit/>
+          </a:bodyPr>
+          <a:p>
+            <a:pPr algn="ctr"/>
+            <a:r>
+              <a:rPr lang="en-US" altLang="zh-CN" sz="11500" b="1">
+                <a:solidFill>
+                  <a:schemeClr val="accent1">
+                    <a:lumMod val="75000"/>
+                  </a:schemeClr>
+                </a:solidFill>
+                <a:effectLst>
+                  <a:outerShdw blurRad="38100" dist="25400" dir="5400000" algn="ctr" rotWithShape="0">
+                    <a:srgbClr val="6E747A">
+                      <a:alpha val="10000"/>
+                    </a:srgbClr>
+                  </a:outerShdw>
+                </a:effectLst>
+                <a:latin typeface="Comic Sans MS" panose="030F0702030302020204" charset="0"/>
+                <a:cs typeface="Comic Sans MS" panose="030F0702030302020204" charset="0"/>
+                <a:sym typeface="+mn-ea"/>
+              </a:rPr>
+              <a:t>e</a:t>
+            </a:r>
+            <a:endParaRPr lang="en-US" altLang="zh-CN" sz="11500" b="1">
+              <a:solidFill>
+                <a:schemeClr val="accent1">
+                  <a:lumMod val="75000"/>
+                </a:schemeClr>
+              </a:solidFill>
+              <a:effectLst>
+                <a:outerShdw blurRad="38100" dist="25400" dir="5400000" algn="ctr" rotWithShape="0">
+                  <a:srgbClr val="6E747A">
+                    <a:alpha val="10000"/>
+                  </a:srgbClr>
+                </a:outerShdw>
+              </a:effectLst>
+              <a:latin typeface="Comic Sans MS" panose="030F0702030302020204" charset="0"/>
+              <a:cs typeface="Comic Sans MS" panose="030F0702030302020204" charset="0"/>
+              <a:sym typeface="+mn-ea"/>
+            </a:endParaRPr>
+          </a:p>
+        </p:txBody>
+      </p:sp>
+      <p:sp>
+        <p:nvSpPr>
+          <p:cNvPr id="17" name="Rectangles 16"/>
+          <p:cNvSpPr/>
+          <p:nvPr/>
+        </p:nvSpPr>
+        <p:spPr>
+          <a:xfrm>
+            <a:off x="6400800" y="3632200"/>
+            <a:ext cx="1005840" cy="975360"/>
+          </a:xfrm>
+          <a:prstGeom prst="rect">
+            <a:avLst/>
+          </a:prstGeom>
+          <a:solidFill>
+            <a:schemeClr val="accent1">
+              <a:lumMod val="20000"/>
+              <a:lumOff val="80000"/>
+            </a:schemeClr>
+          </a:solidFill>
+          <a:ln w="38100"/>
+        </p:spPr>
+        <p:style>
+          <a:lnRef idx="2">
+            <a:schemeClr val="accent1">
+              <a:lumMod val="75000"/>
+            </a:schemeClr>
+          </a:lnRef>
+          <a:fillRef idx="1">
+            <a:schemeClr val="accent1"/>
+          </a:fillRef>
+          <a:effectRef idx="0">
+            <a:srgbClr val="FFFFFF"/>
+          </a:effectRef>
+          <a:fontRef idx="minor">
+            <a:schemeClr val="lt1"/>
+          </a:fontRef>
+        </p:style>
+        <p:txBody>
+          <a:bodyPr rtlCol="0" anchor="ctr"/>
+          <a:p>
+            <a:pPr algn="ctr"/>
+            <a:endParaRPr lang="en-US"/>
+          </a:p>
+        </p:txBody>
+      </p:sp>
+      <p:sp>
+        <p:nvSpPr>
+          <p:cNvPr id="18" name="Text Box 17"/>
+          <p:cNvSpPr txBox="1"/>
+          <p:nvPr/>
+        </p:nvSpPr>
+        <p:spPr>
+          <a:xfrm>
+            <a:off x="6400800" y="3102610"/>
+            <a:ext cx="944880" cy="878840"/>
+          </a:xfrm>
+          <a:prstGeom prst="rect">
+            <a:avLst/>
+          </a:prstGeom>
+          <a:noFill/>
+          <a:effectLst>
+            <a:outerShdw blurRad="50800" dist="38100" dir="2700000" algn="tl" rotWithShape="0">
+              <a:prstClr val="black">
+                <a:alpha val="40000"/>
+              </a:prstClr>
+            </a:outerShdw>
+          </a:effectLst>
+        </p:spPr>
+        <p:txBody>
+          <a:bodyPr wrap="square" rtlCol="0" anchor="t">
+            <a:noAutofit/>
+          </a:bodyPr>
+          <a:p>
+            <a:pPr algn="ctr"/>
+            <a:r>
+              <a:rPr lang="en-US" altLang="zh-CN" sz="9600" b="1">
+                <a:solidFill>
+                  <a:schemeClr val="bg1"/>
+                </a:solidFill>
+                <a:effectLst>
+                  <a:outerShdw blurRad="38100" dist="25400" dir="5400000" algn="ctr" rotWithShape="0">
+                    <a:srgbClr val="6E747A">
+                      <a:alpha val="10000"/>
+                    </a:srgbClr>
+                  </a:outerShdw>
+                </a:effectLst>
+                <a:latin typeface="Comic Sans MS" panose="030F0702030302020204" charset="0"/>
+                <a:cs typeface="Comic Sans MS" panose="030F0702030302020204" charset="0"/>
+                <a:sym typeface="+mn-ea"/>
+              </a:rPr>
+              <a:t>e</a:t>
+            </a:r>
+            <a:endParaRPr lang="en-US" altLang="zh-CN" sz="9600" b="1">
+              <a:solidFill>
+                <a:schemeClr val="bg1"/>
+              </a:solidFill>
+              <a:effectLst>
+                <a:outerShdw blurRad="38100" dist="25400" dir="5400000" algn="ctr" rotWithShape="0">
+                  <a:srgbClr val="6E747A">
+                    <a:alpha val="10000"/>
+                  </a:srgbClr>
+                </a:outerShdw>
+              </a:effectLst>
+              <a:latin typeface="Comic Sans MS" panose="030F0702030302020204" charset="0"/>
+              <a:cs typeface="Comic Sans MS" panose="030F0702030302020204" charset="0"/>
+              <a:sym typeface="+mn-ea"/>
+            </a:endParaRPr>
+          </a:p>
+        </p:txBody>
+      </p:sp>
+      <p:sp>
+        <p:nvSpPr>
+          <p:cNvPr id="19" name="Rectangles 18"/>
+          <p:cNvSpPr/>
+          <p:nvPr/>
+        </p:nvSpPr>
+        <p:spPr>
+          <a:xfrm>
+            <a:off x="1987868" y="1141095"/>
+            <a:ext cx="1231265" cy="1198880"/>
+          </a:xfrm>
+          <a:prstGeom prst="rect">
+            <a:avLst/>
+          </a:prstGeom>
+          <a:solidFill>
+            <a:schemeClr val="accent1">
+              <a:lumMod val="20000"/>
+              <a:lumOff val="80000"/>
+            </a:schemeClr>
+          </a:solidFill>
+          <a:ln w="76200">
+            <a:solidFill>
+              <a:schemeClr val="accent1"/>
+            </a:solidFill>
+          </a:ln>
+        </p:spPr>
+        <p:txBody>
+          <a:bodyPr wrap="none" rtlCol="0" anchor="t">
+            <a:spAutoFit/>
+          </a:bodyPr>
+          <a:p>
+            <a:pPr algn="ctr"/>
+            <a:r>
+              <a:rPr lang="en-US" altLang="zh-CN" sz="7200" b="1">
+                <a:ln w="12700">
+                  <a:solidFill>
+                    <a:schemeClr val="accent1"/>
+                  </a:solidFill>
+                  <a:prstDash val="solid"/>
+                </a:ln>
+                <a:pattFill prst="pct50">
+                  <a:fgClr>
+                    <a:schemeClr val="accent1"/>
+                  </a:fgClr>
+                  <a:bgClr>
+                    <a:schemeClr val="accent1">
+                      <a:lumMod val="20000"/>
+                      <a:lumOff val="80000"/>
+                    </a:schemeClr>
+                  </a:bgClr>
+                </a:pattFill>
+                <a:effectLst>
+                  <a:outerShdw dist="38100" dir="2640000" algn="bl" rotWithShape="0">
+                    <a:schemeClr val="accent1"/>
+                  </a:outerShdw>
+                </a:effectLst>
+              </a:rPr>
+              <a:t>EN</a:t>
+            </a:r>
+            <a:endParaRPr lang="en-US" altLang="zh-CN" sz="7200" b="1">
+              <a:ln w="12700">
+                <a:solidFill>
+                  <a:schemeClr val="accent1"/>
+                </a:solidFill>
+                <a:prstDash val="solid"/>
+              </a:ln>
+              <a:pattFill prst="pct50">
+                <a:fgClr>
+                  <a:schemeClr val="accent1"/>
+                </a:fgClr>
+                <a:bgClr>
+                  <a:schemeClr val="accent1">
+                    <a:lumMod val="20000"/>
+                    <a:lumOff val="80000"/>
+                  </a:schemeClr>
+                </a:bgClr>
+              </a:pattFill>
+              <a:effectLst>
+                <a:outerShdw dist="38100" dir="2640000" algn="bl" rotWithShape="0">
+                  <a:schemeClr val="accent1"/>
+                </a:outerShdw>
+              </a:effectLst>
             </a:endParaRPr>
           </a:p>
         </p:txBody>

</xml_diff>

<commit_message>
Update config and add TopNav component
</commit_message>
<xml_diff>
--- a/dev/notes/icon.pptx
+++ b/dev/notes/icon.pptx
@@ -3589,6 +3589,96 @@
           </a:p>
         </p:txBody>
       </p:sp>
+      <p:sp>
+        <p:nvSpPr>
+          <p:cNvPr id="20" name="Rectangles 19"/>
+          <p:cNvSpPr/>
+          <p:nvPr/>
+        </p:nvSpPr>
+        <p:spPr>
+          <a:xfrm>
+            <a:off x="3703320" y="394335"/>
+            <a:ext cx="2308225" cy="679450"/>
+          </a:xfrm>
+          <a:prstGeom prst="rect">
+            <a:avLst/>
+          </a:prstGeom>
+          <a:solidFill>
+            <a:schemeClr val="accent1">
+              <a:lumMod val="20000"/>
+              <a:lumOff val="80000"/>
+            </a:schemeClr>
+          </a:solidFill>
+          <a:ln w="76200">
+            <a:solidFill>
+              <a:schemeClr val="accent1"/>
+            </a:solidFill>
+          </a:ln>
+        </p:spPr>
+        <p:txBody>
+          <a:bodyPr wrap="square" rtlCol="0" anchor="t">
+            <a:noAutofit/>
+          </a:bodyPr>
+          <a:p>
+            <a:pPr algn="ctr"/>
+            <a:r>
+              <a:rPr lang="en-US" altLang="zh-CN" sz="3600" b="1">
+                <a:ln w="12700">
+                  <a:solidFill>
+                    <a:schemeClr val="accent1"/>
+                  </a:solidFill>
+                  <a:prstDash val="solid"/>
+                </a:ln>
+                <a:pattFill prst="pct50">
+                  <a:fgClr>
+                    <a:schemeClr val="accent1"/>
+                  </a:fgClr>
+                  <a:bgClr>
+                    <a:schemeClr val="accent1">
+                      <a:lumMod val="20000"/>
+                      <a:lumOff val="80000"/>
+                    </a:schemeClr>
+                  </a:bgClr>
+                </a:pattFill>
+                <a:effectLst>
+                  <a:outerShdw dist="38100" dir="2640000" algn="bl" rotWithShape="0">
+                    <a:schemeClr val="accent1"/>
+                  </a:outerShdw>
+                </a:effectLst>
+                <a:latin typeface="Comic Sans MS" panose="030F0702030302020204" charset="0"/>
+                <a:cs typeface="Comic Sans MS" panose="030F0702030302020204" charset="0"/>
+              </a:rPr>
+              <a:t>elb3.com</a:t>
+            </a:r>
+            <a:endParaRPr lang="en-US" altLang="zh-CN" sz="3600" b="1">
+              <a:ln w="12700">
+                <a:solidFill>
+                  <a:schemeClr val="accent1"/>
+                </a:solidFill>
+                <a:prstDash val="solid"/>
+              </a:ln>
+              <a:pattFill prst="pct50">
+                <a:fgClr>
+                  <a:schemeClr val="accent1"/>
+                </a:fgClr>
+                <a:bgClr>
+                  <a:schemeClr val="accent1">
+                    <a:lumMod val="20000"/>
+                    <a:lumOff val="80000"/>
+                  </a:schemeClr>
+                </a:bgClr>
+              </a:pattFill>
+              <a:effectLst>
+                <a:outerShdw dist="38100" dir="2640000" algn="bl" rotWithShape="0">
+                  <a:schemeClr val="accent1"/>
+                </a:outerShdw>
+              </a:effectLst>
+              <a:latin typeface="Comic Sans MS" panose="030F0702030302020204" charset="0"/>
+              <a:cs typeface="Comic Sans MS" panose="030F0702030302020204" charset="0"/>
+            </a:endParaRPr>
+          </a:p>
+        </p:txBody>
+      </p:sp>
     </p:spTree>
   </p:cSld>
   <p:clrMapOvr>

</xml_diff>

<commit_message>
Update TopNav component with new logo and navigation links
</commit_message>
<xml_diff>
--- a/dev/notes/icon.pptx
+++ b/dev/notes/icon.pptx
@@ -3511,7 +3511,7 @@
         </p:nvSpPr>
         <p:spPr>
           <a:xfrm>
-            <a:off x="1987868" y="1141095"/>
+            <a:off x="2191068" y="1461770"/>
             <a:ext cx="1231265" cy="1198880"/>
           </a:xfrm>
           <a:prstGeom prst="rect">
@@ -3543,17 +3543,12 @@
                   </a:solidFill>
                   <a:prstDash val="solid"/>
                 </a:ln>
-                <a:pattFill prst="pct50">
-                  <a:fgClr>
-                    <a:schemeClr val="accent1"/>
-                  </a:fgClr>
-                  <a:bgClr>
-                    <a:schemeClr val="accent1">
-                      <a:lumMod val="20000"/>
-                      <a:lumOff val="80000"/>
-                    </a:schemeClr>
-                  </a:bgClr>
-                </a:pattFill>
+                <a:solidFill>
+                  <a:schemeClr val="accent1">
+                    <a:lumMod val="60000"/>
+                    <a:lumOff val="40000"/>
+                  </a:schemeClr>
+                </a:solidFill>
                 <a:effectLst>
                   <a:outerShdw dist="38100" dir="2640000" algn="bl" rotWithShape="0">
                     <a:schemeClr val="accent1"/>
@@ -3569,17 +3564,12 @@
                 </a:solidFill>
                 <a:prstDash val="solid"/>
               </a:ln>
-              <a:pattFill prst="pct50">
-                <a:fgClr>
-                  <a:schemeClr val="accent1"/>
-                </a:fgClr>
-                <a:bgClr>
-                  <a:schemeClr val="accent1">
-                    <a:lumMod val="20000"/>
-                    <a:lumOff val="80000"/>
-                  </a:schemeClr>
-                </a:bgClr>
-              </a:pattFill>
+              <a:solidFill>
+                <a:schemeClr val="accent1">
+                  <a:lumMod val="60000"/>
+                  <a:lumOff val="40000"/>
+                </a:schemeClr>
+              </a:solidFill>
               <a:effectLst>
                 <a:outerShdw dist="38100" dir="2640000" algn="bl" rotWithShape="0">
                   <a:schemeClr val="accent1"/>
@@ -3675,6 +3665,647 @@
               </a:effectLst>
               <a:latin typeface="Comic Sans MS" panose="030F0702030302020204" charset="0"/>
               <a:cs typeface="Comic Sans MS" panose="030F0702030302020204" charset="0"/>
+            </a:endParaRPr>
+          </a:p>
+        </p:txBody>
+      </p:sp>
+      <p:sp>
+        <p:nvSpPr>
+          <p:cNvPr id="21" name="Rectangles 20"/>
+          <p:cNvSpPr/>
+          <p:nvPr/>
+        </p:nvSpPr>
+        <p:spPr>
+          <a:xfrm>
+            <a:off x="8188960" y="533400"/>
+            <a:ext cx="1005840" cy="975360"/>
+          </a:xfrm>
+          <a:prstGeom prst="rect">
+            <a:avLst/>
+          </a:prstGeom>
+          <a:gradFill>
+            <a:gsLst>
+              <a:gs pos="0">
+                <a:schemeClr val="accent1">
+                  <a:lumMod val="5000"/>
+                  <a:lumOff val="95000"/>
+                </a:schemeClr>
+              </a:gs>
+              <a:gs pos="74000">
+                <a:schemeClr val="accent1">
+                  <a:lumMod val="45000"/>
+                  <a:lumOff val="55000"/>
+                </a:schemeClr>
+              </a:gs>
+              <a:gs pos="83000">
+                <a:schemeClr val="accent1">
+                  <a:lumMod val="45000"/>
+                  <a:lumOff val="55000"/>
+                </a:schemeClr>
+              </a:gs>
+              <a:gs pos="100000">
+                <a:schemeClr val="accent1">
+                  <a:lumMod val="30000"/>
+                  <a:lumOff val="70000"/>
+                </a:schemeClr>
+              </a:gs>
+            </a:gsLst>
+            <a:lin ang="15840000" scaled="0"/>
+          </a:gradFill>
+          <a:ln w="38100"/>
+        </p:spPr>
+        <p:style>
+          <a:lnRef idx="2">
+            <a:schemeClr val="accent1">
+              <a:lumMod val="75000"/>
+            </a:schemeClr>
+          </a:lnRef>
+          <a:fillRef idx="1">
+            <a:schemeClr val="accent1"/>
+          </a:fillRef>
+          <a:effectRef idx="0">
+            <a:srgbClr val="FFFFFF"/>
+          </a:effectRef>
+          <a:fontRef idx="minor">
+            <a:schemeClr val="lt1"/>
+          </a:fontRef>
+        </p:style>
+        <p:txBody>
+          <a:bodyPr rtlCol="0" anchor="ctr"/>
+          <a:p>
+            <a:pPr algn="ctr"/>
+            <a:endParaRPr lang="en-US"/>
+          </a:p>
+        </p:txBody>
+      </p:sp>
+      <p:sp>
+        <p:nvSpPr>
+          <p:cNvPr id="25" name="Rectangles 24"/>
+          <p:cNvSpPr/>
+          <p:nvPr/>
+        </p:nvSpPr>
+        <p:spPr>
+          <a:xfrm>
+            <a:off x="8127365" y="495935"/>
+            <a:ext cx="1087120" cy="645160"/>
+          </a:xfrm>
+          <a:prstGeom prst="rect">
+            <a:avLst/>
+          </a:prstGeom>
+          <a:noFill/>
+          <a:ln>
+            <a:noFill/>
+          </a:ln>
+        </p:spPr>
+        <p:txBody>
+          <a:bodyPr wrap="none" rtlCol="0" anchor="t">
+            <a:spAutoFit/>
+          </a:bodyPr>
+          <a:p>
+            <a:pPr algn="ctr"/>
+            <a:r>
+              <a:rPr lang="en-US" altLang="zh-CN" sz="3600" b="1">
+                <a:ln w="13462">
+                  <a:solidFill>
+                    <a:schemeClr val="accent5">
+                      <a:lumMod val="20000"/>
+                      <a:lumOff val="80000"/>
+                    </a:schemeClr>
+                  </a:solidFill>
+                  <a:prstDash val="solid"/>
+                </a:ln>
+                <a:solidFill>
+                  <a:schemeClr val="tx1">
+                    <a:lumMod val="85000"/>
+                    <a:lumOff val="15000"/>
+                  </a:schemeClr>
+                </a:solidFill>
+                <a:effectLst>
+                  <a:outerShdw dist="38100" dir="2700000" algn="bl" rotWithShape="0">
+                    <a:schemeClr val="accent5"/>
+                  </a:outerShdw>
+                </a:effectLst>
+              </a:rPr>
+              <a:t>ELB3</a:t>
+            </a:r>
+            <a:endParaRPr lang="en-US" altLang="zh-CN" sz="3600" b="1">
+              <a:ln w="13462">
+                <a:solidFill>
+                  <a:schemeClr val="accent5">
+                    <a:lumMod val="20000"/>
+                    <a:lumOff val="80000"/>
+                  </a:schemeClr>
+                </a:solidFill>
+                <a:prstDash val="solid"/>
+              </a:ln>
+              <a:solidFill>
+                <a:schemeClr val="tx1">
+                  <a:lumMod val="85000"/>
+                  <a:lumOff val="15000"/>
+                </a:schemeClr>
+              </a:solidFill>
+              <a:effectLst>
+                <a:outerShdw dist="38100" dir="2700000" algn="bl" rotWithShape="0">
+                  <a:schemeClr val="accent5"/>
+                </a:outerShdw>
+              </a:effectLst>
+            </a:endParaRPr>
+          </a:p>
+        </p:txBody>
+      </p:sp>
+      <p:sp>
+        <p:nvSpPr>
+          <p:cNvPr id="27" name="Rectangles 26"/>
+          <p:cNvSpPr/>
+          <p:nvPr/>
+        </p:nvSpPr>
+        <p:spPr>
+          <a:xfrm>
+            <a:off x="8127365" y="975360"/>
+            <a:ext cx="1117600" cy="506730"/>
+          </a:xfrm>
+          <a:prstGeom prst="rect">
+            <a:avLst/>
+          </a:prstGeom>
+          <a:noFill/>
+          <a:ln>
+            <a:noFill/>
+          </a:ln>
+        </p:spPr>
+        <p:txBody>
+          <a:bodyPr wrap="none" rtlCol="0" anchor="t">
+            <a:spAutoFit/>
+          </a:bodyPr>
+          <a:p>
+            <a:pPr algn="ctr"/>
+            <a:r>
+              <a:rPr lang="en-US" altLang="zh-CN" sz="2700" b="1">
+                <a:ln w="13462">
+                  <a:solidFill>
+                    <a:schemeClr val="accent5">
+                      <a:lumMod val="40000"/>
+                      <a:lumOff val="60000"/>
+                    </a:schemeClr>
+                  </a:solidFill>
+                  <a:prstDash val="solid"/>
+                </a:ln>
+                <a:solidFill>
+                  <a:schemeClr val="tx1">
+                    <a:lumMod val="85000"/>
+                    <a:lumOff val="15000"/>
+                  </a:schemeClr>
+                </a:solidFill>
+                <a:effectLst>
+                  <a:outerShdw dist="38100" dir="2700000" algn="bl" rotWithShape="0">
+                    <a:schemeClr val="accent5"/>
+                  </a:outerShdw>
+                </a:effectLst>
+              </a:rPr>
+              <a:t>COMU</a:t>
+            </a:r>
+            <a:endParaRPr lang="en-US" altLang="zh-CN" sz="2700" b="1">
+              <a:ln w="13462">
+                <a:solidFill>
+                  <a:schemeClr val="accent5">
+                    <a:lumMod val="40000"/>
+                    <a:lumOff val="60000"/>
+                  </a:schemeClr>
+                </a:solidFill>
+                <a:prstDash val="solid"/>
+              </a:ln>
+              <a:solidFill>
+                <a:schemeClr val="tx1">
+                  <a:lumMod val="85000"/>
+                  <a:lumOff val="15000"/>
+                </a:schemeClr>
+              </a:solidFill>
+              <a:effectLst>
+                <a:outerShdw dist="38100" dir="2700000" algn="bl" rotWithShape="0">
+                  <a:schemeClr val="accent5"/>
+                </a:outerShdw>
+              </a:effectLst>
+            </a:endParaRPr>
+          </a:p>
+        </p:txBody>
+      </p:sp>
+      <p:sp>
+        <p:nvSpPr>
+          <p:cNvPr id="29" name="Rectangles 28"/>
+          <p:cNvSpPr/>
+          <p:nvPr/>
+        </p:nvSpPr>
+        <p:spPr>
+          <a:xfrm>
+            <a:off x="6537960" y="486410"/>
+            <a:ext cx="1005840" cy="975360"/>
+          </a:xfrm>
+          <a:prstGeom prst="rect">
+            <a:avLst/>
+          </a:prstGeom>
+          <a:gradFill>
+            <a:gsLst>
+              <a:gs pos="0">
+                <a:schemeClr val="accent1">
+                  <a:lumMod val="5000"/>
+                  <a:lumOff val="95000"/>
+                </a:schemeClr>
+              </a:gs>
+              <a:gs pos="74000">
+                <a:schemeClr val="accent1">
+                  <a:lumMod val="45000"/>
+                  <a:lumOff val="55000"/>
+                </a:schemeClr>
+              </a:gs>
+              <a:gs pos="83000">
+                <a:schemeClr val="accent1">
+                  <a:lumMod val="45000"/>
+                  <a:lumOff val="55000"/>
+                </a:schemeClr>
+              </a:gs>
+              <a:gs pos="100000">
+                <a:schemeClr val="accent1">
+                  <a:lumMod val="30000"/>
+                  <a:lumOff val="70000"/>
+                </a:schemeClr>
+              </a:gs>
+            </a:gsLst>
+            <a:lin ang="15840000" scaled="0"/>
+          </a:gradFill>
+          <a:ln w="38100"/>
+        </p:spPr>
+        <p:style>
+          <a:lnRef idx="2">
+            <a:schemeClr val="accent1">
+              <a:lumMod val="75000"/>
+            </a:schemeClr>
+          </a:lnRef>
+          <a:fillRef idx="1">
+            <a:schemeClr val="accent1"/>
+          </a:fillRef>
+          <a:effectRef idx="0">
+            <a:srgbClr val="FFFFFF"/>
+          </a:effectRef>
+          <a:fontRef idx="minor">
+            <a:schemeClr val="lt1"/>
+          </a:fontRef>
+        </p:style>
+        <p:txBody>
+          <a:bodyPr rtlCol="0" anchor="ctr"/>
+          <a:p>
+            <a:pPr algn="ctr"/>
+            <a:endParaRPr lang="en-US"/>
+          </a:p>
+        </p:txBody>
+      </p:sp>
+      <p:sp>
+        <p:nvSpPr>
+          <p:cNvPr id="30" name="Rectangles 29"/>
+          <p:cNvSpPr/>
+          <p:nvPr/>
+        </p:nvSpPr>
+        <p:spPr>
+          <a:xfrm>
+            <a:off x="10196830" y="606425"/>
+            <a:ext cx="866140" cy="1568450"/>
+          </a:xfrm>
+          <a:prstGeom prst="rect">
+            <a:avLst/>
+          </a:prstGeom>
+          <a:noFill/>
+          <a:ln>
+            <a:noFill/>
+          </a:ln>
+        </p:spPr>
+        <p:txBody>
+          <a:bodyPr wrap="none" rtlCol="0" anchor="t">
+            <a:spAutoFit/>
+          </a:bodyPr>
+          <a:p>
+            <a:pPr algn="ctr"/>
+            <a:r>
+              <a:rPr lang="en-US" altLang="zh-CN" sz="9600" b="1">
+                <a:ln w="15875"/>
+                <a:gradFill>
+                  <a:gsLst>
+                    <a:gs pos="0">
+                      <a:srgbClr val="FFC000"/>
+                    </a:gs>
+                    <a:gs pos="100000">
+                      <a:schemeClr val="bg1"/>
+                    </a:gs>
+                  </a:gsLst>
+                  <a:lin ang="2700000" scaled="0"/>
+                </a:gradFill>
+                <a:effectLst/>
+              </a:rPr>
+              <a:t>B</a:t>
+            </a:r>
+            <a:endParaRPr lang="en-US" altLang="zh-CN" sz="9600" b="1">
+              <a:ln w="15875"/>
+              <a:gradFill>
+                <a:gsLst>
+                  <a:gs pos="0">
+                    <a:srgbClr val="FFC000"/>
+                  </a:gs>
+                  <a:gs pos="100000">
+                    <a:schemeClr val="bg1"/>
+                  </a:gs>
+                </a:gsLst>
+                <a:lin ang="2700000" scaled="0"/>
+              </a:gradFill>
+              <a:effectLst/>
+            </a:endParaRPr>
+          </a:p>
+        </p:txBody>
+      </p:sp>
+      <p:sp>
+        <p:nvSpPr>
+          <p:cNvPr id="31" name="Rectangles 30"/>
+          <p:cNvSpPr/>
+          <p:nvPr/>
+        </p:nvSpPr>
+        <p:spPr>
+          <a:xfrm>
+            <a:off x="6710680" y="655320"/>
+            <a:ext cx="660400" cy="121920"/>
+          </a:xfrm>
+          <a:prstGeom prst="rect">
+            <a:avLst/>
+          </a:prstGeom>
+          <a:solidFill>
+            <a:schemeClr val="accent4">
+              <a:lumMod val="60000"/>
+              <a:lumOff val="40000"/>
+            </a:schemeClr>
+          </a:solidFill>
+        </p:spPr>
+        <p:style>
+          <a:lnRef idx="2">
+            <a:schemeClr val="accent1">
+              <a:lumMod val="75000"/>
+            </a:schemeClr>
+          </a:lnRef>
+          <a:fillRef idx="1">
+            <a:schemeClr val="accent1"/>
+          </a:fillRef>
+          <a:effectRef idx="0">
+            <a:srgbClr val="FFFFFF"/>
+          </a:effectRef>
+          <a:fontRef idx="minor">
+            <a:schemeClr val="lt1"/>
+          </a:fontRef>
+        </p:style>
+        <p:txBody>
+          <a:bodyPr rtlCol="0" anchor="ctr"/>
+          <a:p>
+            <a:pPr algn="ctr"/>
+            <a:endParaRPr lang="en-US"/>
+          </a:p>
+        </p:txBody>
+      </p:sp>
+      <p:grpSp>
+        <p:nvGrpSpPr>
+          <p:cNvPr id="34" name="Group 33"/>
+          <p:cNvGrpSpPr/>
+          <p:nvPr/>
+        </p:nvGrpSpPr>
+        <p:grpSpPr>
+          <a:xfrm>
+            <a:off x="6710680" y="904240"/>
+            <a:ext cx="660400" cy="375920"/>
+            <a:chOff x="10568" y="1424"/>
+            <a:chExt cx="1040" cy="592"/>
+          </a:xfrm>
+        </p:grpSpPr>
+        <p:sp>
+          <p:nvSpPr>
+            <p:cNvPr id="32" name="Rectangles 31"/>
+            <p:cNvSpPr/>
+            <p:nvPr/>
+          </p:nvSpPr>
+          <p:spPr>
+            <a:xfrm>
+              <a:off x="10568" y="1424"/>
+              <a:ext cx="1040" cy="192"/>
+            </a:xfrm>
+            <a:prstGeom prst="rect">
+              <a:avLst/>
+            </a:prstGeom>
+            <a:solidFill>
+              <a:schemeClr val="accent4">
+                <a:lumMod val="60000"/>
+                <a:lumOff val="40000"/>
+              </a:schemeClr>
+            </a:solidFill>
+          </p:spPr>
+          <p:style>
+            <a:lnRef idx="2">
+              <a:schemeClr val="accent1">
+                <a:lumMod val="75000"/>
+              </a:schemeClr>
+            </a:lnRef>
+            <a:fillRef idx="1">
+              <a:schemeClr val="accent1"/>
+            </a:fillRef>
+            <a:effectRef idx="0">
+              <a:srgbClr val="FFFFFF"/>
+            </a:effectRef>
+            <a:fontRef idx="minor">
+              <a:schemeClr val="lt1"/>
+            </a:fontRef>
+          </p:style>
+          <p:txBody>
+            <a:bodyPr rtlCol="0" anchor="ctr"/>
+            <a:p>
+              <a:pPr algn="ctr"/>
+              <a:endParaRPr lang="en-US"/>
+            </a:p>
+          </p:txBody>
+        </p:sp>
+        <p:sp>
+          <p:nvSpPr>
+            <p:cNvPr id="33" name="Rectangles 32"/>
+            <p:cNvSpPr/>
+            <p:nvPr/>
+          </p:nvSpPr>
+          <p:spPr>
+            <a:xfrm>
+              <a:off x="10568" y="1824"/>
+              <a:ext cx="1040" cy="192"/>
+            </a:xfrm>
+            <a:prstGeom prst="rect">
+              <a:avLst/>
+            </a:prstGeom>
+            <a:solidFill>
+              <a:schemeClr val="accent4">
+                <a:lumMod val="60000"/>
+                <a:lumOff val="40000"/>
+              </a:schemeClr>
+            </a:solidFill>
+          </p:spPr>
+          <p:style>
+            <a:lnRef idx="2">
+              <a:schemeClr val="accent1">
+                <a:lumMod val="75000"/>
+              </a:schemeClr>
+            </a:lnRef>
+            <a:fillRef idx="1">
+              <a:schemeClr val="accent1"/>
+            </a:fillRef>
+            <a:effectRef idx="0">
+              <a:srgbClr val="FFFFFF"/>
+            </a:effectRef>
+            <a:fontRef idx="minor">
+              <a:schemeClr val="lt1"/>
+            </a:fontRef>
+          </p:style>
+          <p:txBody>
+            <a:bodyPr rtlCol="0" anchor="ctr"/>
+            <a:p>
+              <a:pPr algn="ctr"/>
+              <a:endParaRPr lang="en-US"/>
+            </a:p>
+          </p:txBody>
+        </p:sp>
+      </p:grpSp>
+      <p:sp>
+        <p:nvSpPr>
+          <p:cNvPr id="35" name="Rectangles 34"/>
+          <p:cNvSpPr/>
+          <p:nvPr/>
+        </p:nvSpPr>
+        <p:spPr>
+          <a:xfrm>
+            <a:off x="758508" y="3176905"/>
+            <a:ext cx="1231265" cy="1198880"/>
+          </a:xfrm>
+          <a:prstGeom prst="rect">
+            <a:avLst/>
+          </a:prstGeom>
+          <a:gradFill>
+            <a:gsLst>
+              <a:gs pos="0">
+                <a:schemeClr val="accent1">
+                  <a:lumMod val="5000"/>
+                  <a:lumOff val="95000"/>
+                </a:schemeClr>
+              </a:gs>
+              <a:gs pos="74000">
+                <a:schemeClr val="accent1">
+                  <a:lumMod val="45000"/>
+                  <a:lumOff val="55000"/>
+                </a:schemeClr>
+              </a:gs>
+              <a:gs pos="83000">
+                <a:schemeClr val="accent1">
+                  <a:lumMod val="45000"/>
+                  <a:lumOff val="55000"/>
+                </a:schemeClr>
+              </a:gs>
+              <a:gs pos="100000">
+                <a:schemeClr val="accent1">
+                  <a:lumMod val="30000"/>
+                  <a:lumOff val="70000"/>
+                </a:schemeClr>
+              </a:gs>
+            </a:gsLst>
+            <a:lin ang="6180000" scaled="0"/>
+          </a:gradFill>
+          <a:ln w="76200">
+            <a:gradFill>
+              <a:gsLst>
+                <a:gs pos="0">
+                  <a:schemeClr val="accent1">
+                    <a:lumMod val="75000"/>
+                  </a:schemeClr>
+                </a:gs>
+                <a:gs pos="99000">
+                  <a:srgbClr val="669CCE">
+                    <a:alpha val="100000"/>
+                  </a:srgbClr>
+                </a:gs>
+                <a:gs pos="52000">
+                  <a:schemeClr val="accent1">
+                    <a:lumMod val="60000"/>
+                    <a:lumOff val="40000"/>
+                  </a:schemeClr>
+                </a:gs>
+              </a:gsLst>
+              <a:path path="shape">
+                <a:fillToRect l="50000" t="50000" r="50000" b="50000"/>
+              </a:path>
+              <a:tileRect/>
+            </a:gradFill>
+          </a:ln>
+        </p:spPr>
+        <p:txBody>
+          <a:bodyPr wrap="none" rtlCol="0" anchor="t">
+            <a:spAutoFit/>
+          </a:bodyPr>
+          <a:p>
+            <a:pPr algn="ctr"/>
+            <a:r>
+              <a:rPr lang="en-US" altLang="zh-CN" sz="7200" b="1">
+                <a:ln w="12700">
+                  <a:solidFill>
+                    <a:schemeClr val="accent1"/>
+                  </a:solidFill>
+                  <a:prstDash val="solid"/>
+                </a:ln>
+                <a:gradFill>
+                  <a:gsLst>
+                    <a:gs pos="0">
+                      <a:schemeClr val="accent1">
+                        <a:lumMod val="40000"/>
+                        <a:lumOff val="60000"/>
+                      </a:schemeClr>
+                    </a:gs>
+                    <a:gs pos="100000">
+                      <a:schemeClr val="accent1">
+                        <a:lumMod val="84000"/>
+                        <a:lumOff val="16000"/>
+                      </a:schemeClr>
+                    </a:gs>
+                  </a:gsLst>
+                  <a:lin ang="2700000" scaled="0"/>
+                </a:gradFill>
+                <a:effectLst>
+                  <a:outerShdw dist="38100" dir="2640000" algn="bl" rotWithShape="0">
+                    <a:schemeClr val="accent1"/>
+                  </a:outerShdw>
+                </a:effectLst>
+              </a:rPr>
+              <a:t>EN</a:t>
+            </a:r>
+            <a:endParaRPr lang="en-US" altLang="zh-CN" sz="7200" b="1">
+              <a:ln w="12700">
+                <a:solidFill>
+                  <a:schemeClr val="accent1"/>
+                </a:solidFill>
+                <a:prstDash val="solid"/>
+              </a:ln>
+              <a:gradFill>
+                <a:gsLst>
+                  <a:gs pos="0">
+                    <a:schemeClr val="accent1">
+                      <a:lumMod val="40000"/>
+                      <a:lumOff val="60000"/>
+                    </a:schemeClr>
+                  </a:gs>
+                  <a:gs pos="100000">
+                    <a:schemeClr val="accent1">
+                      <a:lumMod val="84000"/>
+                      <a:lumOff val="16000"/>
+                    </a:schemeClr>
+                  </a:gs>
+                </a:gsLst>
+                <a:lin ang="2700000" scaled="0"/>
+              </a:gradFill>
+              <a:effectLst>
+                <a:outerShdw dist="38100" dir="2640000" algn="bl" rotWithShape="0">
+                  <a:schemeClr val="accent1"/>
+                </a:outerShdw>
+              </a:effectLst>
             </a:endParaRPr>
           </a:p>
         </p:txBody>

</xml_diff>

<commit_message>
Add useRouter hook and fix TopNav logo styling
</commit_message>
<xml_diff>
--- a/dev/notes/icon.pptx
+++ b/dev/notes/icon.pptx
@@ -6,6 +6,8 @@
   </p:sldMasterIdLst>
   <p:sldIdLst>
     <p:sldId id="256" r:id="rId3"/>
+    <p:sldId id="257" r:id="rId4"/>
+    <p:sldId id="258" r:id="rId5"/>
   </p:sldIdLst>
   <p:sldSz cx="12192000" cy="6858000"/>
   <p:notesSz cx="6858000" cy="9144000"/>
@@ -3034,7 +3036,6 @@
             <a:pPr algn="ctr"/>
             <a:r>
               <a:rPr lang="en-US" altLang="zh-CN" sz="11500" b="1">
-                <a:ln/>
                 <a:solidFill>
                   <a:schemeClr val="accent1"/>
                 </a:solidFill>
@@ -3051,7 +3052,6 @@
               <a:t>elb</a:t>
             </a:r>
             <a:endParaRPr lang="en-US" altLang="zh-CN" sz="11500" b="1">
-              <a:ln/>
               <a:solidFill>
                 <a:schemeClr val="accent1"/>
               </a:solidFill>
@@ -3095,7 +3095,6 @@
             <a:pPr algn="ctr"/>
             <a:r>
               <a:rPr lang="en-US" altLang="zh-CN" sz="16600" b="1">
-                <a:ln/>
                 <a:solidFill>
                   <a:schemeClr val="accent1"/>
                 </a:solidFill>
@@ -3110,7 +3109,6 @@
               <a:t>E</a:t>
             </a:r>
             <a:endParaRPr lang="en-US" altLang="zh-CN" sz="16600" b="1">
-              <a:ln/>
               <a:solidFill>
                 <a:schemeClr val="accent1"/>
               </a:solidFill>
@@ -3220,7 +3218,6 @@
             <a:pPr algn="ctr"/>
             <a:r>
               <a:rPr lang="en-US" altLang="zh-CN" sz="6600" b="1">
-                <a:ln/>
                 <a:solidFill>
                   <a:schemeClr val="accent1"/>
                 </a:solidFill>
@@ -3237,7 +3234,6 @@
               <a:t>elb3</a:t>
             </a:r>
             <a:endParaRPr lang="en-US" altLang="zh-CN" sz="6600" b="1">
-              <a:ln/>
               <a:solidFill>
                 <a:schemeClr val="accent1"/>
               </a:solidFill>
@@ -4310,6 +4306,598 @@
           </a:p>
         </p:txBody>
       </p:sp>
+      <p:sp>
+        <p:nvSpPr>
+          <p:cNvPr id="2" name="Rectangles 1"/>
+          <p:cNvSpPr/>
+          <p:nvPr/>
+        </p:nvSpPr>
+        <p:spPr>
+          <a:xfrm>
+            <a:off x="5903913" y="5024120"/>
+            <a:ext cx="1231265" cy="1198880"/>
+          </a:xfrm>
+          <a:prstGeom prst="rect">
+            <a:avLst/>
+          </a:prstGeom>
+          <a:solidFill>
+            <a:schemeClr val="accent1">
+              <a:lumMod val="20000"/>
+              <a:lumOff val="80000"/>
+            </a:schemeClr>
+          </a:solidFill>
+          <a:ln w="76200">
+            <a:solidFill>
+              <a:srgbClr val="00B0F0"/>
+            </a:solidFill>
+          </a:ln>
+        </p:spPr>
+        <p:txBody>
+          <a:bodyPr wrap="none" rtlCol="0" anchor="t">
+            <a:spAutoFit/>
+          </a:bodyPr>
+          <a:p>
+            <a:pPr algn="ctr"/>
+            <a:r>
+              <a:rPr lang="en-US" altLang="zh-CN" sz="7200" b="1">
+                <a:ln w="12700">
+                  <a:solidFill>
+                    <a:schemeClr val="accent1"/>
+                  </a:solidFill>
+                  <a:prstDash val="solid"/>
+                </a:ln>
+                <a:pattFill prst="pct5">
+                  <a:fgClr>
+                    <a:srgbClr val="CACFFD"/>
+                  </a:fgClr>
+                  <a:bgClr>
+                    <a:srgbClr val="BCB7FF"/>
+                  </a:bgClr>
+                </a:pattFill>
+                <a:effectLst>
+                  <a:outerShdw dist="38100" dir="2640000" algn="bl" rotWithShape="0">
+                    <a:schemeClr val="accent1"/>
+                  </a:outerShdw>
+                </a:effectLst>
+              </a:rPr>
+              <a:t>EN</a:t>
+            </a:r>
+            <a:endParaRPr lang="en-US" altLang="zh-CN" sz="7200" b="1">
+              <a:ln w="12700">
+                <a:solidFill>
+                  <a:schemeClr val="accent1"/>
+                </a:solidFill>
+                <a:prstDash val="solid"/>
+              </a:ln>
+              <a:pattFill prst="pct5">
+                <a:fgClr>
+                  <a:srgbClr val="CACFFD"/>
+                </a:fgClr>
+                <a:bgClr>
+                  <a:srgbClr val="BCB7FF"/>
+                </a:bgClr>
+              </a:pattFill>
+              <a:effectLst>
+                <a:outerShdw dist="38100" dir="2640000" algn="bl" rotWithShape="0">
+                  <a:schemeClr val="accent1"/>
+                </a:outerShdw>
+              </a:effectLst>
+            </a:endParaRPr>
+          </a:p>
+        </p:txBody>
+      </p:sp>
+      <p:sp>
+        <p:nvSpPr>
+          <p:cNvPr id="3" name="Rectangles 2"/>
+          <p:cNvSpPr/>
+          <p:nvPr/>
+        </p:nvSpPr>
+        <p:spPr>
+          <a:xfrm>
+            <a:off x="8146415" y="5024120"/>
+            <a:ext cx="1362710" cy="1198880"/>
+          </a:xfrm>
+          <a:prstGeom prst="rect">
+            <a:avLst/>
+          </a:prstGeom>
+          <a:solidFill>
+            <a:schemeClr val="accent1">
+              <a:lumMod val="20000"/>
+              <a:lumOff val="80000"/>
+            </a:schemeClr>
+          </a:solidFill>
+          <a:ln w="76200">
+            <a:solidFill>
+              <a:srgbClr val="00B0F0"/>
+            </a:solidFill>
+          </a:ln>
+        </p:spPr>
+        <p:txBody>
+          <a:bodyPr wrap="square" rtlCol="0" anchor="t">
+            <a:spAutoFit/>
+          </a:bodyPr>
+          <a:p>
+            <a:pPr algn="ctr"/>
+            <a:r>
+              <a:rPr lang="en-US" altLang="zh-CN" sz="7200" b="1">
+                <a:ln w="12700">
+                  <a:solidFill>
+                    <a:schemeClr val="accent1"/>
+                  </a:solidFill>
+                  <a:prstDash val="solid"/>
+                </a:ln>
+                <a:pattFill prst="pct5">
+                  <a:fgClr>
+                    <a:srgbClr val="CACFFD"/>
+                  </a:fgClr>
+                  <a:bgClr>
+                    <a:srgbClr val="BCB7FF"/>
+                  </a:bgClr>
+                </a:pattFill>
+                <a:effectLst>
+                  <a:outerShdw dist="38100" dir="2640000" algn="bl" rotWithShape="0">
+                    <a:schemeClr val="accent1"/>
+                  </a:outerShdw>
+                </a:effectLst>
+                <a:latin typeface="MV Boli" panose="02000500030200090000" charset="0"/>
+                <a:cs typeface="MV Boli" panose="02000500030200090000" charset="0"/>
+              </a:rPr>
+              <a:t>e</a:t>
+            </a:r>
+            <a:endParaRPr lang="en-US" altLang="zh-CN" sz="7200" b="1">
+              <a:ln w="12700">
+                <a:solidFill>
+                  <a:schemeClr val="accent1"/>
+                </a:solidFill>
+                <a:prstDash val="solid"/>
+              </a:ln>
+              <a:pattFill prst="pct5">
+                <a:fgClr>
+                  <a:srgbClr val="CACFFD"/>
+                </a:fgClr>
+                <a:bgClr>
+                  <a:srgbClr val="BCB7FF"/>
+                </a:bgClr>
+              </a:pattFill>
+              <a:effectLst>
+                <a:outerShdw dist="38100" dir="2640000" algn="bl" rotWithShape="0">
+                  <a:schemeClr val="accent1"/>
+                </a:outerShdw>
+              </a:effectLst>
+              <a:latin typeface="MV Boli" panose="02000500030200090000" charset="0"/>
+              <a:cs typeface="MV Boli" panose="02000500030200090000" charset="0"/>
+            </a:endParaRPr>
+          </a:p>
+        </p:txBody>
+      </p:sp>
+      <p:sp>
+        <p:nvSpPr>
+          <p:cNvPr id="4" name="Rectangles 3"/>
+          <p:cNvSpPr/>
+          <p:nvPr/>
+        </p:nvSpPr>
+        <p:spPr>
+          <a:xfrm>
+            <a:off x="350203" y="533400"/>
+            <a:ext cx="1119505" cy="1198880"/>
+          </a:xfrm>
+          <a:prstGeom prst="rect">
+            <a:avLst/>
+          </a:prstGeom>
+          <a:solidFill>
+            <a:schemeClr val="accent1">
+              <a:lumMod val="20000"/>
+              <a:lumOff val="80000"/>
+            </a:schemeClr>
+          </a:solidFill>
+          <a:ln w="76200">
+            <a:solidFill>
+              <a:schemeClr val="accent1"/>
+            </a:solidFill>
+          </a:ln>
+        </p:spPr>
+        <p:txBody>
+          <a:bodyPr wrap="none" rtlCol="0" anchor="t">
+            <a:spAutoFit/>
+          </a:bodyPr>
+          <a:p>
+            <a:pPr algn="ctr"/>
+            <a:r>
+              <a:rPr lang="en-US" altLang="zh-CN" sz="7200" b="1">
+                <a:ln w="12700">
+                  <a:noFill/>
+                  <a:prstDash val="solid"/>
+                </a:ln>
+                <a:solidFill>
+                  <a:schemeClr val="accent1">
+                    <a:lumMod val="50000"/>
+                  </a:schemeClr>
+                </a:solidFill>
+                <a:effectLst>
+                  <a:outerShdw dist="38100" dir="2640000" algn="bl" rotWithShape="0">
+                    <a:schemeClr val="accent1"/>
+                  </a:outerShdw>
+                </a:effectLst>
+              </a:rPr>
+              <a:t>En</a:t>
+            </a:r>
+            <a:endParaRPr lang="en-US" altLang="zh-CN" sz="7200" b="1">
+              <a:ln w="12700">
+                <a:noFill/>
+                <a:prstDash val="solid"/>
+              </a:ln>
+              <a:solidFill>
+                <a:schemeClr val="accent1">
+                  <a:lumMod val="50000"/>
+                </a:schemeClr>
+              </a:solidFill>
+              <a:effectLst>
+                <a:outerShdw dist="38100" dir="2640000" algn="bl" rotWithShape="0">
+                  <a:schemeClr val="accent1"/>
+                </a:outerShdw>
+              </a:effectLst>
+            </a:endParaRPr>
+          </a:p>
+        </p:txBody>
+      </p:sp>
+      <p:sp>
+        <p:nvSpPr>
+          <p:cNvPr id="5" name="Rectangles 4"/>
+          <p:cNvSpPr/>
+          <p:nvPr/>
+        </p:nvSpPr>
+        <p:spPr>
+          <a:xfrm>
+            <a:off x="423546" y="4954905"/>
+            <a:ext cx="1497330" cy="1198880"/>
+          </a:xfrm>
+          <a:prstGeom prst="rect">
+            <a:avLst/>
+          </a:prstGeom>
+          <a:solidFill>
+            <a:schemeClr val="accent1">
+              <a:lumMod val="20000"/>
+              <a:lumOff val="80000"/>
+            </a:schemeClr>
+          </a:solidFill>
+          <a:ln w="76200">
+            <a:solidFill>
+              <a:schemeClr val="accent1"/>
+            </a:solidFill>
+          </a:ln>
+        </p:spPr>
+        <p:txBody>
+          <a:bodyPr wrap="none" rtlCol="0" anchor="t">
+            <a:spAutoFit/>
+          </a:bodyPr>
+          <a:p>
+            <a:pPr algn="ctr"/>
+            <a:r>
+              <a:rPr lang="en-US" altLang="zh-CN" sz="7200" b="1">
+                <a:ln w="12700">
+                  <a:solidFill>
+                    <a:schemeClr val="accent1"/>
+                  </a:solidFill>
+                  <a:prstDash val="solid"/>
+                </a:ln>
+                <a:solidFill>
+                  <a:schemeClr val="accent1">
+                    <a:lumMod val="60000"/>
+                    <a:lumOff val="40000"/>
+                  </a:schemeClr>
+                </a:solidFill>
+                <a:effectLst>
+                  <a:outerShdw dist="38100" dir="2640000" algn="bl" rotWithShape="0">
+                    <a:schemeClr val="accent1"/>
+                  </a:outerShdw>
+                </a:effectLst>
+                <a:latin typeface="Comic Sans MS" panose="030F0702030302020204" charset="0"/>
+                <a:cs typeface="Comic Sans MS" panose="030F0702030302020204" charset="0"/>
+              </a:rPr>
+              <a:t>EN</a:t>
+            </a:r>
+            <a:endParaRPr lang="en-US" altLang="zh-CN" sz="7200" b="1">
+              <a:ln w="12700">
+                <a:solidFill>
+                  <a:schemeClr val="accent1"/>
+                </a:solidFill>
+                <a:prstDash val="solid"/>
+              </a:ln>
+              <a:solidFill>
+                <a:schemeClr val="accent1">
+                  <a:lumMod val="60000"/>
+                  <a:lumOff val="40000"/>
+                </a:schemeClr>
+              </a:solidFill>
+              <a:effectLst>
+                <a:outerShdw dist="38100" dir="2640000" algn="bl" rotWithShape="0">
+                  <a:schemeClr val="accent1"/>
+                </a:outerShdw>
+              </a:effectLst>
+              <a:latin typeface="Comic Sans MS" panose="030F0702030302020204" charset="0"/>
+              <a:cs typeface="Comic Sans MS" panose="030F0702030302020204" charset="0"/>
+            </a:endParaRPr>
+          </a:p>
+        </p:txBody>
+      </p:sp>
+    </p:spTree>
+  </p:cSld>
+  <p:clrMapOvr>
+    <a:masterClrMapping/>
+  </p:clrMapOvr>
+</p:sld>
+</file>
+
+<file path=ppt/slides/slide2.xml><?xml version="1.0" encoding="utf-8"?>
+<p:sld xmlns:a="http://schemas.openxmlformats.org/drawingml/2006/main" xmlns:r="http://schemas.openxmlformats.org/officeDocument/2006/relationships" xmlns:p="http://schemas.openxmlformats.org/presentationml/2006/main">
+  <p:cSld>
+    <p:spTree>
+      <p:nvGrpSpPr>
+        <p:cNvPr id="1" name=""/>
+        <p:cNvGrpSpPr/>
+        <p:nvPr/>
+      </p:nvGrpSpPr>
+      <p:grpSpPr/>
+      <p:sp>
+        <p:nvSpPr>
+          <p:cNvPr id="2" name="Title 1"/>
+          <p:cNvSpPr>
+            <a:spLocks noGrp="1"/>
+          </p:cNvSpPr>
+          <p:nvPr>
+            <p:ph type="title"/>
+          </p:nvPr>
+        </p:nvSpPr>
+        <p:spPr/>
+        <p:txBody>
+          <a:bodyPr/>
+          <a:p>
+            <a:endParaRPr lang="en-US"/>
+          </a:p>
+        </p:txBody>
+      </p:sp>
+      <p:sp>
+        <p:nvSpPr>
+          <p:cNvPr id="3" name="Content Placeholder 2"/>
+          <p:cNvSpPr>
+            <a:spLocks noGrp="1"/>
+          </p:cNvSpPr>
+          <p:nvPr>
+            <p:ph idx="1"/>
+          </p:nvPr>
+        </p:nvSpPr>
+        <p:spPr/>
+        <p:txBody>
+          <a:bodyPr/>
+          <a:p>
+            <a:endParaRPr lang="en-US"/>
+          </a:p>
+        </p:txBody>
+      </p:sp>
+      <p:pic>
+        <p:nvPicPr>
+          <p:cNvPr id="4" name="Picture 3" descr="QQ截图20240203024635"/>
+          <p:cNvPicPr>
+            <a:picLocks noChangeAspect="1"/>
+          </p:cNvPicPr>
+          <p:nvPr/>
+        </p:nvPicPr>
+        <p:blipFill>
+          <a:blip r:embed="rId1"/>
+          <a:stretch>
+            <a:fillRect/>
+          </a:stretch>
+        </p:blipFill>
+        <p:spPr>
+          <a:xfrm>
+            <a:off x="2832735" y="2926715"/>
+            <a:ext cx="2528570" cy="2550160"/>
+          </a:xfrm>
+          <a:prstGeom prst="rect">
+            <a:avLst/>
+          </a:prstGeom>
+          <a:ln w="38100">
+            <a:solidFill>
+              <a:srgbClr val="54C2FA">
+                <a:alpha val="76000"/>
+              </a:srgbClr>
+            </a:solidFill>
+          </a:ln>
+          <a:effectLst/>
+        </p:spPr>
+      </p:pic>
+      <p:sp>
+        <p:nvSpPr>
+          <p:cNvPr id="5" name="Rectangles 4"/>
+          <p:cNvSpPr/>
+          <p:nvPr/>
+        </p:nvSpPr>
+        <p:spPr>
+          <a:xfrm>
+            <a:off x="6928485" y="1868805"/>
+            <a:ext cx="2813050" cy="2813050"/>
+          </a:xfrm>
+          <a:prstGeom prst="rect">
+            <a:avLst/>
+          </a:prstGeom>
+          <a:solidFill>
+            <a:srgbClr val="057AB1"/>
+          </a:solidFill>
+        </p:spPr>
+        <p:style>
+          <a:lnRef idx="2">
+            <a:schemeClr val="accent1">
+              <a:lumMod val="75000"/>
+            </a:schemeClr>
+          </a:lnRef>
+          <a:fillRef idx="1">
+            <a:schemeClr val="accent1"/>
+          </a:fillRef>
+          <a:effectRef idx="0">
+            <a:srgbClr val="FFFFFF"/>
+          </a:effectRef>
+          <a:fontRef idx="minor">
+            <a:schemeClr val="lt1"/>
+          </a:fontRef>
+        </p:style>
+        <p:txBody>
+          <a:bodyPr rtlCol="0" anchor="ctr"/>
+          <a:p>
+            <a:pPr algn="ctr"/>
+            <a:endParaRPr lang="en-US" sz="13800">
+              <a:latin typeface="MV Boli" panose="02000500030200090000" charset="0"/>
+              <a:cs typeface="MV Boli" panose="02000500030200090000" charset="0"/>
+            </a:endParaRPr>
+          </a:p>
+        </p:txBody>
+      </p:sp>
+      <p:sp>
+        <p:nvSpPr>
+          <p:cNvPr id="6" name="Text Box 5"/>
+          <p:cNvSpPr txBox="1"/>
+          <p:nvPr/>
+        </p:nvSpPr>
+        <p:spPr>
+          <a:xfrm>
+            <a:off x="6857365" y="2035810"/>
+            <a:ext cx="4064000" cy="2646045"/>
+          </a:xfrm>
+          <a:prstGeom prst="rect">
+            <a:avLst/>
+          </a:prstGeom>
+          <a:noFill/>
+        </p:spPr>
+        <p:txBody>
+          <a:bodyPr wrap="square" rtlCol="0">
+            <a:spAutoFit/>
+          </a:bodyPr>
+          <a:p>
+            <a:r>
+              <a:rPr lang="en-US" sz="16600">
+                <a:solidFill>
+                  <a:schemeClr val="bg1"/>
+                </a:solidFill>
+                <a:latin typeface="Constantia" panose="02030602050306030303" charset="0"/>
+                <a:cs typeface="Constantia" panose="02030602050306030303" charset="0"/>
+              </a:rPr>
+              <a:t>EN</a:t>
+            </a:r>
+            <a:endParaRPr lang="en-US" sz="16600">
+              <a:solidFill>
+                <a:schemeClr val="bg1"/>
+              </a:solidFill>
+              <a:latin typeface="Constantia" panose="02030602050306030303" charset="0"/>
+              <a:cs typeface="Constantia" panose="02030602050306030303" charset="0"/>
+            </a:endParaRPr>
+          </a:p>
+        </p:txBody>
+      </p:sp>
+    </p:spTree>
+  </p:cSld>
+  <p:clrMapOvr>
+    <a:masterClrMapping/>
+  </p:clrMapOvr>
+</p:sld>
+</file>
+
+<file path=ppt/slides/slide3.xml><?xml version="1.0" encoding="utf-8"?>
+<p:sld xmlns:a="http://schemas.openxmlformats.org/drawingml/2006/main" xmlns:r="http://schemas.openxmlformats.org/officeDocument/2006/relationships" xmlns:p="http://schemas.openxmlformats.org/presentationml/2006/main">
+  <p:cSld>
+    <p:spTree>
+      <p:nvGrpSpPr>
+        <p:cNvPr id="1" name=""/>
+        <p:cNvGrpSpPr/>
+        <p:nvPr/>
+      </p:nvGrpSpPr>
+      <p:grpSpPr/>
+      <p:sp>
+        <p:nvSpPr>
+          <p:cNvPr id="2" name="Title 1"/>
+          <p:cNvSpPr>
+            <a:spLocks noGrp="1"/>
+          </p:cNvSpPr>
+          <p:nvPr>
+            <p:ph type="title"/>
+          </p:nvPr>
+        </p:nvSpPr>
+        <p:spPr/>
+        <p:txBody>
+          <a:bodyPr/>
+          <a:p>
+            <a:endParaRPr lang="en-US"/>
+          </a:p>
+        </p:txBody>
+      </p:sp>
+      <p:sp>
+        <p:nvSpPr>
+          <p:cNvPr id="3" name="Content Placeholder 2"/>
+          <p:cNvSpPr>
+            <a:spLocks noGrp="1"/>
+          </p:cNvSpPr>
+          <p:nvPr>
+            <p:ph idx="1"/>
+          </p:nvPr>
+        </p:nvSpPr>
+        <p:spPr/>
+        <p:txBody>
+          <a:bodyPr/>
+          <a:p>
+            <a:endParaRPr lang="en-US"/>
+          </a:p>
+        </p:txBody>
+      </p:sp>
+      <p:pic>
+        <p:nvPicPr>
+          <p:cNvPr id="100" name="Picture 99"/>
+          <p:cNvPicPr/>
+          <p:nvPr/>
+        </p:nvPicPr>
+        <p:blipFill>
+          <a:blip r:embed="rId1"/>
+          <a:stretch>
+            <a:fillRect/>
+          </a:stretch>
+        </p:blipFill>
+        <p:spPr>
+          <a:xfrm>
+            <a:off x="2476500" y="2816860"/>
+            <a:ext cx="3850640" cy="3850640"/>
+          </a:xfrm>
+          <a:prstGeom prst="rect">
+            <a:avLst/>
+          </a:prstGeom>
+          <a:noFill/>
+          <a:ln w="9525">
+            <a:noFill/>
+          </a:ln>
+        </p:spPr>
+      </p:pic>
+      <p:pic>
+        <p:nvPicPr>
+          <p:cNvPr id="101" name="Picture 100"/>
+          <p:cNvPicPr/>
+          <p:nvPr/>
+        </p:nvPicPr>
+        <p:blipFill>
+          <a:blip r:embed="rId2"/>
+          <a:stretch>
+            <a:fillRect/>
+          </a:stretch>
+        </p:blipFill>
+        <p:spPr>
+          <a:xfrm>
+            <a:off x="3345180" y="3856990"/>
+            <a:ext cx="2133600" cy="1420495"/>
+          </a:xfrm>
+          <a:prstGeom prst="rect">
+            <a:avLst/>
+          </a:prstGeom>
+          <a:noFill/>
+          <a:ln w="9525">
+            <a:noFill/>
+          </a:ln>
+        </p:spPr>
+      </p:pic>
     </p:spTree>
   </p:cSld>
   <p:clrMapOvr>

</xml_diff>